<commit_message>
small fix in heading
</commit_message>
<xml_diff>
--- a/Präsentation/Berufsethik.pptx
+++ b/Präsentation/Berufsethik.pptx
@@ -7010,9 +7010,10 @@
           </a:p>
           <a:p>
             <a:r>
-              <a:rPr lang="de-DE" dirty="0"/>
-              <a:t>Ansätze</a:t>
-            </a:r>
+              <a:rPr lang="de-DE"/>
+              <a:t>Kernthesen</a:t>
+            </a:r>
+            <a:endParaRPr lang="de-DE" dirty="0"/>
           </a:p>
           <a:p>
             <a:r>

</xml_diff>

<commit_message>
Präsentation Nietzsche Chatbots = Übermensch?
</commit_message>
<xml_diff>
--- a/Präsentation/Berufsethik.pptx
+++ b/Präsentation/Berufsethik.pptx
@@ -6725,12 +6725,12 @@
             </a:r>
           </a:p>
           <a:p>
-            <a:pPr>
+            <a:pPr lvl="1">
               <a:buFont typeface="Wingdings" panose="05000000000000000000" pitchFamily="2" charset="2"/>
               <a:buChar char="Ø"/>
             </a:pPr>
             <a:r>
-              <a:rPr lang="de-DE" dirty="0"/>
+              <a:rPr lang="de-DE" sz="2800" dirty="0"/>
               <a:t>Alle Zustände müssen sich unendlich oft wiederholen</a:t>
             </a:r>
           </a:p>
@@ -7364,7 +7364,9 @@
         </p:nvSpPr>
         <p:spPr/>
         <p:txBody>
-          <a:bodyPr/>
+          <a:bodyPr>
+            <a:normAutofit/>
+          </a:bodyPr>
           <a:lstStyle/>
           <a:p>
             <a:pPr marL="0" indent="0">
@@ -7385,20 +7387,99 @@
             </a:r>
             <a:r>
               <a:rPr lang="de-DE" b="1" dirty="0"/>
+              <a:t> = Übermensch?</a:t>
+            </a:r>
+            <a:endParaRPr lang="de-DE" sz="2800" dirty="0"/>
+          </a:p>
+          <a:p>
+            <a:r>
+              <a:rPr lang="de-DE" dirty="0"/>
+              <a:t>Aktuelle </a:t>
+            </a:r>
+            <a:r>
+              <a:rPr lang="de-DE" dirty="0" err="1"/>
+              <a:t>Chatbots</a:t>
+            </a:r>
+            <a:r>
+              <a:rPr lang="de-DE" dirty="0"/>
               <a:t> </a:t>
             </a:r>
-            <a:r>
-              <a:rPr lang="de-DE" b="1"/>
-              <a:t>= Übermensch?</a:t>
-            </a:r>
-            <a:endParaRPr lang="de-DE" sz="2800" dirty="0"/>
-          </a:p>
-          <a:p>
-            <a:pPr>
+          </a:p>
+          <a:p>
+            <a:pPr lvl="1">
               <a:buFont typeface="Wingdings" panose="05000000000000000000" pitchFamily="2" charset="2"/>
               <a:buChar char="Ø"/>
             </a:pPr>
+            <a:r>
+              <a:rPr lang="de-DE" dirty="0"/>
+              <a:t> </a:t>
+            </a:r>
+            <a:r>
+              <a:rPr lang="de-DE" sz="2800" dirty="0"/>
+              <a:t>Kein „Wille zur Macht“</a:t>
+            </a:r>
+          </a:p>
+          <a:p>
+            <a:r>
+              <a:rPr lang="de-DE" dirty="0"/>
+              <a:t>Zukünftige </a:t>
+            </a:r>
+            <a:r>
+              <a:rPr lang="de-DE" dirty="0" err="1"/>
+              <a:t>Chatbots</a:t>
+            </a:r>
             <a:endParaRPr lang="de-DE" dirty="0"/>
+          </a:p>
+          <a:p>
+            <a:pPr lvl="1">
+              <a:buFont typeface="Wingdings" panose="05000000000000000000" pitchFamily="2" charset="2"/>
+              <a:buChar char="Ø"/>
+            </a:pPr>
+            <a:r>
+              <a:rPr lang="de-DE" sz="2800" dirty="0"/>
+              <a:t>Intellektuell dem Menschen überlegen</a:t>
+            </a:r>
+          </a:p>
+          <a:p>
+            <a:pPr lvl="1">
+              <a:buFont typeface="Wingdings" panose="05000000000000000000" pitchFamily="2" charset="2"/>
+              <a:buChar char="Ø"/>
+            </a:pPr>
+            <a:r>
+              <a:rPr lang="de-DE" sz="2800" dirty="0"/>
+              <a:t>„Wille zur Macht“ eventuell möglich</a:t>
+            </a:r>
+          </a:p>
+          <a:p>
+            <a:pPr lvl="1">
+              <a:buFont typeface="Wingdings" panose="05000000000000000000" pitchFamily="2" charset="2"/>
+              <a:buChar char="Ø"/>
+            </a:pPr>
+            <a:r>
+              <a:rPr lang="de-DE" sz="2800" dirty="0"/>
+              <a:t> Aber: physisch dem Menschen unterlegen</a:t>
+            </a:r>
+          </a:p>
+          <a:p>
+            <a:pPr marL="0" indent="0">
+              <a:buNone/>
+            </a:pPr>
+            <a:r>
+              <a:rPr lang="de-DE" b="1" dirty="0"/>
+              <a:t>Konklusion: </a:t>
+            </a:r>
+            <a:r>
+              <a:rPr lang="de-DE" dirty="0"/>
+              <a:t>Zukünftige </a:t>
+            </a:r>
+            <a:r>
+              <a:rPr lang="de-DE" dirty="0" err="1"/>
+              <a:t>Chatbots</a:t>
+            </a:r>
+            <a:r>
+              <a:rPr lang="de-DE" dirty="0"/>
+              <a:t> eine Art von Übermensch</a:t>
+            </a:r>
           </a:p>
         </p:txBody>
       </p:sp>
@@ -7498,6 +7579,227 @@
   <p:clrMapOvr>
     <a:masterClrMapping/>
   </p:clrMapOvr>
+  <p:timing>
+    <p:tnLst>
+      <p:par>
+        <p:cTn id="1" dur="indefinite" restart="never" nodeType="tmRoot">
+          <p:childTnLst>
+            <p:seq concurrent="1" nextAc="seek">
+              <p:cTn id="2" dur="indefinite" nodeType="mainSeq">
+                <p:childTnLst>
+                  <p:par>
+                    <p:cTn id="3" fill="hold">
+                      <p:stCondLst>
+                        <p:cond delay="indefinite"/>
+                      </p:stCondLst>
+                      <p:childTnLst>
+                        <p:par>
+                          <p:cTn id="4" fill="hold">
+                            <p:stCondLst>
+                              <p:cond delay="0"/>
+                            </p:stCondLst>
+                            <p:childTnLst>
+                              <p:par>
+                                <p:cTn id="5" presetID="1" presetClass="entr" presetSubtype="0" fill="hold" nodeType="clickEffect">
+                                  <p:stCondLst>
+                                    <p:cond delay="0"/>
+                                  </p:stCondLst>
+                                  <p:childTnLst>
+                                    <p:set>
+                                      <p:cBhvr>
+                                        <p:cTn id="6" dur="1" fill="hold">
+                                          <p:stCondLst>
+                                            <p:cond delay="0"/>
+                                          </p:stCondLst>
+                                        </p:cTn>
+                                        <p:tgtEl>
+                                          <p:spTgt spid="3">
+                                            <p:txEl>
+                                              <p:pRg st="4" end="4"/>
+                                            </p:txEl>
+                                          </p:spTgt>
+                                        </p:tgtEl>
+                                        <p:attrNameLst>
+                                          <p:attrName>style.visibility</p:attrName>
+                                        </p:attrNameLst>
+                                      </p:cBhvr>
+                                      <p:to>
+                                        <p:strVal val="visible"/>
+                                      </p:to>
+                                    </p:set>
+                                  </p:childTnLst>
+                                </p:cTn>
+                              </p:par>
+                              <p:par>
+                                <p:cTn id="7" presetID="1" presetClass="entr" presetSubtype="0" fill="hold" nodeType="withEffect">
+                                  <p:stCondLst>
+                                    <p:cond delay="0"/>
+                                  </p:stCondLst>
+                                  <p:childTnLst>
+                                    <p:set>
+                                      <p:cBhvr>
+                                        <p:cTn id="8" dur="1" fill="hold">
+                                          <p:stCondLst>
+                                            <p:cond delay="0"/>
+                                          </p:stCondLst>
+                                        </p:cTn>
+                                        <p:tgtEl>
+                                          <p:spTgt spid="3">
+                                            <p:txEl>
+                                              <p:pRg st="5" end="5"/>
+                                            </p:txEl>
+                                          </p:spTgt>
+                                        </p:tgtEl>
+                                        <p:attrNameLst>
+                                          <p:attrName>style.visibility</p:attrName>
+                                        </p:attrNameLst>
+                                      </p:cBhvr>
+                                      <p:to>
+                                        <p:strVal val="visible"/>
+                                      </p:to>
+                                    </p:set>
+                                  </p:childTnLst>
+                                </p:cTn>
+                              </p:par>
+                              <p:par>
+                                <p:cTn id="9" presetID="1" presetClass="entr" presetSubtype="0" fill="hold" nodeType="withEffect">
+                                  <p:stCondLst>
+                                    <p:cond delay="0"/>
+                                  </p:stCondLst>
+                                  <p:childTnLst>
+                                    <p:set>
+                                      <p:cBhvr>
+                                        <p:cTn id="10" dur="1" fill="hold">
+                                          <p:stCondLst>
+                                            <p:cond delay="0"/>
+                                          </p:stCondLst>
+                                        </p:cTn>
+                                        <p:tgtEl>
+                                          <p:spTgt spid="3">
+                                            <p:txEl>
+                                              <p:pRg st="6" end="6"/>
+                                            </p:txEl>
+                                          </p:spTgt>
+                                        </p:tgtEl>
+                                        <p:attrNameLst>
+                                          <p:attrName>style.visibility</p:attrName>
+                                        </p:attrNameLst>
+                                      </p:cBhvr>
+                                      <p:to>
+                                        <p:strVal val="visible"/>
+                                      </p:to>
+                                    </p:set>
+                                  </p:childTnLst>
+                                </p:cTn>
+                              </p:par>
+                              <p:par>
+                                <p:cTn id="11" presetID="1" presetClass="entr" presetSubtype="0" fill="hold" nodeType="withEffect">
+                                  <p:stCondLst>
+                                    <p:cond delay="0"/>
+                                  </p:stCondLst>
+                                  <p:childTnLst>
+                                    <p:set>
+                                      <p:cBhvr>
+                                        <p:cTn id="12" dur="1" fill="hold">
+                                          <p:stCondLst>
+                                            <p:cond delay="0"/>
+                                          </p:stCondLst>
+                                        </p:cTn>
+                                        <p:tgtEl>
+                                          <p:spTgt spid="3">
+                                            <p:txEl>
+                                              <p:pRg st="7" end="7"/>
+                                            </p:txEl>
+                                          </p:spTgt>
+                                        </p:tgtEl>
+                                        <p:attrNameLst>
+                                          <p:attrName>style.visibility</p:attrName>
+                                        </p:attrNameLst>
+                                      </p:cBhvr>
+                                      <p:to>
+                                        <p:strVal val="visible"/>
+                                      </p:to>
+                                    </p:set>
+                                  </p:childTnLst>
+                                </p:cTn>
+                              </p:par>
+                            </p:childTnLst>
+                          </p:cTn>
+                        </p:par>
+                      </p:childTnLst>
+                    </p:cTn>
+                  </p:par>
+                  <p:par>
+                    <p:cTn id="13" fill="hold">
+                      <p:stCondLst>
+                        <p:cond delay="indefinite"/>
+                      </p:stCondLst>
+                      <p:childTnLst>
+                        <p:par>
+                          <p:cTn id="14" fill="hold">
+                            <p:stCondLst>
+                              <p:cond delay="0"/>
+                            </p:stCondLst>
+                            <p:childTnLst>
+                              <p:par>
+                                <p:cTn id="15" presetID="1" presetClass="entr" presetSubtype="0" fill="hold" nodeType="clickEffect">
+                                  <p:stCondLst>
+                                    <p:cond delay="0"/>
+                                  </p:stCondLst>
+                                  <p:childTnLst>
+                                    <p:set>
+                                      <p:cBhvr>
+                                        <p:cTn id="16" dur="1" fill="hold">
+                                          <p:stCondLst>
+                                            <p:cond delay="0"/>
+                                          </p:stCondLst>
+                                        </p:cTn>
+                                        <p:tgtEl>
+                                          <p:spTgt spid="3">
+                                            <p:txEl>
+                                              <p:pRg st="8" end="8"/>
+                                            </p:txEl>
+                                          </p:spTgt>
+                                        </p:tgtEl>
+                                        <p:attrNameLst>
+                                          <p:attrName>style.visibility</p:attrName>
+                                        </p:attrNameLst>
+                                      </p:cBhvr>
+                                      <p:to>
+                                        <p:strVal val="visible"/>
+                                      </p:to>
+                                    </p:set>
+                                  </p:childTnLst>
+                                </p:cTn>
+                              </p:par>
+                            </p:childTnLst>
+                          </p:cTn>
+                        </p:par>
+                      </p:childTnLst>
+                    </p:cTn>
+                  </p:par>
+                </p:childTnLst>
+              </p:cTn>
+              <p:prevCondLst>
+                <p:cond evt="onPrev" delay="0">
+                  <p:tgtEl>
+                    <p:sldTgt/>
+                  </p:tgtEl>
+                </p:cond>
+              </p:prevCondLst>
+              <p:nextCondLst>
+                <p:cond evt="onNext" delay="0">
+                  <p:tgtEl>
+                    <p:sldTgt/>
+                  </p:tgtEl>
+                </p:cond>
+              </p:nextCondLst>
+            </p:seq>
+          </p:childTnLst>
+        </p:cTn>
+      </p:par>
+    </p:tnLst>
+  </p:timing>
 </p:sld>
 </file>
 

</xml_diff>

<commit_message>
Nietzsche Kernthese kleine Anpassung
</commit_message>
<xml_diff>
--- a/Präsentation/Berufsethik.pptx
+++ b/Präsentation/Berufsethik.pptx
@@ -226,7 +226,7 @@
           <a:p>
             <a:fld id="{B3F4BEC4-04EF-4CD0-BB52-1E33FCB75C1A}" type="datetimeFigureOut">
               <a:rPr lang="de-DE" smtClean="0"/>
-              <a:t>12.12.2017</a:t>
+              <a:t>14.12.2017</a:t>
             </a:fld>
             <a:endParaRPr lang="de-DE"/>
           </a:p>
@@ -1317,7 +1317,7 @@
           <a:p>
             <a:fld id="{34FCBE35-913E-4F5C-B82A-017151C3CF2E}" type="datetime1">
               <a:rPr lang="de-DE" smtClean="0"/>
-              <a:t>12.12.2017</a:t>
+              <a:t>14.12.2017</a:t>
             </a:fld>
             <a:endParaRPr lang="de-DE"/>
           </a:p>
@@ -1518,7 +1518,7 @@
           <a:p>
             <a:fld id="{2847ED52-B3C1-44AF-867B-E694896FE8F6}" type="datetime1">
               <a:rPr lang="de-DE" smtClean="0"/>
-              <a:t>12.12.2017</a:t>
+              <a:t>14.12.2017</a:t>
             </a:fld>
             <a:endParaRPr lang="de-DE"/>
           </a:p>
@@ -1729,7 +1729,7 @@
           <a:p>
             <a:fld id="{168BBAB2-6C7F-4450-A2AE-93CA97D58F94}" type="datetime1">
               <a:rPr lang="de-DE" smtClean="0"/>
-              <a:t>12.12.2017</a:t>
+              <a:t>14.12.2017</a:t>
             </a:fld>
             <a:endParaRPr lang="de-DE"/>
           </a:p>
@@ -1930,7 +1930,7 @@
           <a:p>
             <a:fld id="{37AAA59D-F5D9-4C22-BAD7-C7D8B056DE27}" type="datetime1">
               <a:rPr lang="de-DE" smtClean="0"/>
-              <a:t>12.12.2017</a:t>
+              <a:t>14.12.2017</a:t>
             </a:fld>
             <a:endParaRPr lang="de-DE"/>
           </a:p>
@@ -2208,7 +2208,7 @@
           <a:p>
             <a:fld id="{9E51E155-D360-4F19-A00F-78921EA1ECE0}" type="datetime1">
               <a:rPr lang="de-DE" smtClean="0"/>
-              <a:t>12.12.2017</a:t>
+              <a:t>14.12.2017</a:t>
             </a:fld>
             <a:endParaRPr lang="de-DE"/>
           </a:p>
@@ -2476,7 +2476,7 @@
           <a:p>
             <a:fld id="{E6839657-0B65-4D4D-95AE-D65A41317F2F}" type="datetime1">
               <a:rPr lang="de-DE" smtClean="0"/>
-              <a:t>12.12.2017</a:t>
+              <a:t>14.12.2017</a:t>
             </a:fld>
             <a:endParaRPr lang="de-DE"/>
           </a:p>
@@ -2891,7 +2891,7 @@
           <a:p>
             <a:fld id="{6556EF25-1D90-48A5-9D2B-C9B4C61351C3}" type="datetime1">
               <a:rPr lang="de-DE" smtClean="0"/>
-              <a:t>12.12.2017</a:t>
+              <a:t>14.12.2017</a:t>
             </a:fld>
             <a:endParaRPr lang="de-DE"/>
           </a:p>
@@ -3035,7 +3035,7 @@
           <a:p>
             <a:fld id="{E2A457FF-C8C2-4DB2-80B3-297A90E469B1}" type="datetime1">
               <a:rPr lang="de-DE" smtClean="0"/>
-              <a:t>12.12.2017</a:t>
+              <a:t>14.12.2017</a:t>
             </a:fld>
             <a:endParaRPr lang="de-DE"/>
           </a:p>
@@ -3151,7 +3151,7 @@
           <a:p>
             <a:fld id="{AD6C03A5-7FB1-43B2-8884-E9E9EB5E2312}" type="datetime1">
               <a:rPr lang="de-DE" smtClean="0"/>
-              <a:t>12.12.2017</a:t>
+              <a:t>14.12.2017</a:t>
             </a:fld>
             <a:endParaRPr lang="de-DE"/>
           </a:p>
@@ -3465,7 +3465,7 @@
           <a:p>
             <a:fld id="{2B9C9779-0FB9-4BCD-864C-0ACBE9ACB817}" type="datetime1">
               <a:rPr lang="de-DE" smtClean="0"/>
-              <a:t>12.12.2017</a:t>
+              <a:t>14.12.2017</a:t>
             </a:fld>
             <a:endParaRPr lang="de-DE"/>
           </a:p>
@@ -3756,7 +3756,7 @@
           <a:p>
             <a:fld id="{1F8E1D88-FA2D-4A0F-A99E-4B1D00F2DADF}" type="datetime1">
               <a:rPr lang="de-DE" smtClean="0"/>
-              <a:t>12.12.2017</a:t>
+              <a:t>14.12.2017</a:t>
             </a:fld>
             <a:endParaRPr lang="de-DE"/>
           </a:p>
@@ -4000,7 +4000,7 @@
           <a:p>
             <a:fld id="{4468ECC2-9D94-478C-A60A-A7D4155B71A1}" type="datetime1">
               <a:rPr lang="de-DE" smtClean="0"/>
-              <a:t>12.12.2017</a:t>
+              <a:t>14.12.2017</a:t>
             </a:fld>
             <a:endParaRPr lang="de-DE"/>
           </a:p>
@@ -4534,7 +4534,7 @@
           <a:p>
             <a:fld id="{9BB24A88-594C-46B6-B0D5-054D34368737}" type="datetime1">
               <a:rPr lang="de-DE" smtClean="0"/>
-              <a:t>12.12.2017</a:t>
+              <a:t>14.12.2017</a:t>
             </a:fld>
             <a:endParaRPr lang="de-DE"/>
           </a:p>
@@ -4853,7 +4853,7 @@
           <a:p>
             <a:fld id="{37AAA59D-F5D9-4C22-BAD7-C7D8B056DE27}" type="datetime1">
               <a:rPr lang="de-DE" smtClean="0"/>
-              <a:t>12.12.2017</a:t>
+              <a:t>14.12.2017</a:t>
             </a:fld>
             <a:endParaRPr lang="de-DE"/>
           </a:p>
@@ -5059,7 +5059,7 @@
           <a:p>
             <a:fld id="{37AAA59D-F5D9-4C22-BAD7-C7D8B056DE27}" type="datetime1">
               <a:rPr lang="de-DE" smtClean="0"/>
-              <a:t>12.12.2017</a:t>
+              <a:t>14.12.2017</a:t>
             </a:fld>
             <a:endParaRPr lang="de-DE"/>
           </a:p>
@@ -5258,7 +5258,7 @@
           <a:p>
             <a:fld id="{37AAA59D-F5D9-4C22-BAD7-C7D8B056DE27}" type="datetime1">
               <a:rPr lang="de-DE" smtClean="0"/>
-              <a:t>12.12.2017</a:t>
+              <a:t>14.12.2017</a:t>
             </a:fld>
             <a:endParaRPr lang="de-DE"/>
           </a:p>
@@ -5454,7 +5454,7 @@
           <a:p>
             <a:fld id="{37AAA59D-F5D9-4C22-BAD7-C7D8B056DE27}" type="datetime1">
               <a:rPr lang="de-DE" smtClean="0"/>
-              <a:t>12.12.2017</a:t>
+              <a:t>14.12.2017</a:t>
             </a:fld>
             <a:endParaRPr lang="de-DE"/>
           </a:p>
@@ -5629,7 +5629,7 @@
           <a:p>
             <a:fld id="{37AAA59D-F5D9-4C22-BAD7-C7D8B056DE27}" type="datetime1">
               <a:rPr lang="de-DE" smtClean="0"/>
-              <a:t>12.12.2017</a:t>
+              <a:t>14.12.2017</a:t>
             </a:fld>
             <a:endParaRPr lang="de-DE"/>
           </a:p>
@@ -6762,7 +6762,7 @@
           <a:p>
             <a:fld id="{37AAA59D-F5D9-4C22-BAD7-C7D8B056DE27}" type="datetime1">
               <a:rPr lang="de-DE" smtClean="0"/>
-              <a:t>12.12.2017</a:t>
+              <a:t>14.12.2017</a:t>
             </a:fld>
             <a:endParaRPr lang="de-DE"/>
           </a:p>
@@ -6934,7 +6934,15 @@
             </a:pPr>
             <a:r>
               <a:rPr lang="de-DE" sz="2800" dirty="0"/>
-              <a:t>Überwindung von Nihilismus, Religion und Moral</a:t>
+              <a:t>Überwindung </a:t>
+            </a:r>
+            <a:r>
+              <a:rPr lang="de-DE" sz="2800"/>
+              <a:t>von Religion </a:t>
+            </a:r>
+            <a:r>
+              <a:rPr lang="de-DE" sz="2800" dirty="0"/>
+              <a:t>und Moral</a:t>
             </a:r>
           </a:p>
           <a:p>
@@ -6988,7 +6996,7 @@
           <a:p>
             <a:fld id="{37AAA59D-F5D9-4C22-BAD7-C7D8B056DE27}" type="datetime1">
               <a:rPr lang="de-DE" smtClean="0"/>
-              <a:t>12.12.2017</a:t>
+              <a:t>14.12.2017</a:t>
             </a:fld>
             <a:endParaRPr lang="de-DE"/>
           </a:p>
@@ -7225,7 +7233,7 @@
           <a:p>
             <a:fld id="{37AAA59D-F5D9-4C22-BAD7-C7D8B056DE27}" type="datetime1">
               <a:rPr lang="de-DE" smtClean="0"/>
-              <a:t>12.12.2017</a:t>
+              <a:t>14.12.2017</a:t>
             </a:fld>
             <a:endParaRPr lang="de-DE"/>
           </a:p>
@@ -7507,7 +7515,7 @@
           <a:p>
             <a:fld id="{37AAA59D-F5D9-4C22-BAD7-C7D8B056DE27}" type="datetime1">
               <a:rPr lang="de-DE" smtClean="0"/>
-              <a:t>12.12.2017</a:t>
+              <a:t>14.12.2017</a:t>
             </a:fld>
             <a:endParaRPr lang="de-DE"/>
           </a:p>
@@ -7957,7 +7965,7 @@
           <a:p>
             <a:fld id="{37AAA59D-F5D9-4C22-BAD7-C7D8B056DE27}" type="datetime1">
               <a:rPr lang="de-DE" smtClean="0"/>
-              <a:t>12.12.2017</a:t>
+              <a:t>14.12.2017</a:t>
             </a:fld>
             <a:endParaRPr lang="de-DE"/>
           </a:p>
@@ -8154,7 +8162,7 @@
           <a:p>
             <a:fld id="{1B876D99-6DEA-420F-AEAC-AB387BCD608A}" type="datetime1">
               <a:rPr lang="de-DE" smtClean="0"/>
-              <a:t>12.12.2017</a:t>
+              <a:t>14.12.2017</a:t>
             </a:fld>
             <a:endParaRPr lang="de-DE"/>
           </a:p>
@@ -8381,7 +8389,7 @@
           <a:p>
             <a:fld id="{37AAA59D-F5D9-4C22-BAD7-C7D8B056DE27}" type="datetime1">
               <a:rPr lang="de-DE" smtClean="0"/>
-              <a:t>12.12.2017</a:t>
+              <a:t>14.12.2017</a:t>
             </a:fld>
             <a:endParaRPr lang="de-DE"/>
           </a:p>
@@ -8636,7 +8644,7 @@
           <a:p>
             <a:fld id="{37AAA59D-F5D9-4C22-BAD7-C7D8B056DE27}" type="datetime1">
               <a:rPr lang="de-DE" smtClean="0"/>
-              <a:t>12.12.2017</a:t>
+              <a:t>14.12.2017</a:t>
             </a:fld>
             <a:endParaRPr lang="de-DE"/>
           </a:p>
@@ -8941,7 +8949,7 @@
           <a:p>
             <a:fld id="{37AAA59D-F5D9-4C22-BAD7-C7D8B056DE27}" type="datetime1">
               <a:rPr lang="de-DE" smtClean="0"/>
-              <a:t>12.12.2017</a:t>
+              <a:t>14.12.2017</a:t>
             </a:fld>
             <a:endParaRPr lang="de-DE"/>
           </a:p>
@@ -9085,7 +9093,7 @@
           <a:p>
             <a:fld id="{37AAA59D-F5D9-4C22-BAD7-C7D8B056DE27}" type="datetime1">
               <a:rPr lang="de-DE" smtClean="0"/>
-              <a:t>12.12.2017</a:t>
+              <a:t>14.12.2017</a:t>
             </a:fld>
             <a:endParaRPr lang="de-DE"/>
           </a:p>
@@ -9371,7 +9379,7 @@
           <a:p>
             <a:fld id="{37AAA59D-F5D9-4C22-BAD7-C7D8B056DE27}" type="datetime1">
               <a:rPr lang="de-DE" smtClean="0"/>
-              <a:t>12.12.2017</a:t>
+              <a:t>14.12.2017</a:t>
             </a:fld>
             <a:endParaRPr lang="de-DE"/>
           </a:p>
@@ -9561,7 +9569,7 @@
           <a:p>
             <a:fld id="{37AAA59D-F5D9-4C22-BAD7-C7D8B056DE27}" type="datetime1">
               <a:rPr lang="de-DE" smtClean="0"/>
-              <a:t>12.12.2017</a:t>
+              <a:t>14.12.2017</a:t>
             </a:fld>
             <a:endParaRPr lang="de-DE"/>
           </a:p>
@@ -9736,7 +9744,7 @@
           <a:p>
             <a:fld id="{37AAA59D-F5D9-4C22-BAD7-C7D8B056DE27}" type="datetime1">
               <a:rPr lang="de-DE" smtClean="0"/>
-              <a:t>12.12.2017</a:t>
+              <a:t>14.12.2017</a:t>
             </a:fld>
             <a:endParaRPr lang="de-DE"/>
           </a:p>
@@ -9959,7 +9967,7 @@
           <a:p>
             <a:fld id="{37AAA59D-F5D9-4C22-BAD7-C7D8B056DE27}" type="datetime1">
               <a:rPr lang="de-DE" smtClean="0"/>
-              <a:t>12.12.2017</a:t>
+              <a:t>14.12.2017</a:t>
             </a:fld>
             <a:endParaRPr lang="de-DE"/>
           </a:p>
@@ -10246,7 +10254,7 @@
           <a:p>
             <a:fld id="{37AAA59D-F5D9-4C22-BAD7-C7D8B056DE27}" type="datetime1">
               <a:rPr lang="de-DE" smtClean="0"/>
-              <a:t>12.12.2017</a:t>
+              <a:t>14.12.2017</a:t>
             </a:fld>
             <a:endParaRPr lang="de-DE"/>
           </a:p>
@@ -10495,7 +10503,7 @@
           <a:p>
             <a:fld id="{37AAA59D-F5D9-4C22-BAD7-C7D8B056DE27}" type="datetime1">
               <a:rPr lang="de-DE" smtClean="0"/>
-              <a:t>12.12.2017</a:t>
+              <a:t>14.12.2017</a:t>
             </a:fld>
             <a:endParaRPr lang="de-DE"/>
           </a:p>
@@ -10726,7 +10734,7 @@
           <a:p>
             <a:fld id="{37AAA59D-F5D9-4C22-BAD7-C7D8B056DE27}" type="datetime1">
               <a:rPr lang="de-DE" smtClean="0"/>
-              <a:t>12.12.2017</a:t>
+              <a:t>14.12.2017</a:t>
             </a:fld>
             <a:endParaRPr lang="de-DE"/>
           </a:p>

</xml_diff>

<commit_message>
Nietzsche Chatbot = Übermensch kleine Anpassung
</commit_message>
<xml_diff>
--- a/Präsentation/Berufsethik.pptx
+++ b/Präsentation/Berufsethik.pptx
@@ -6934,15 +6934,7 @@
             </a:pPr>
             <a:r>
               <a:rPr lang="de-DE" sz="2800" dirty="0"/>
-              <a:t>Überwindung </a:t>
-            </a:r>
-            <a:r>
-              <a:rPr lang="de-DE" sz="2800"/>
-              <a:t>von Religion </a:t>
-            </a:r>
-            <a:r>
-              <a:rPr lang="de-DE" sz="2800" dirty="0"/>
-              <a:t>und Moral</a:t>
+              <a:t>Überwindung von Religion und Moral</a:t>
             </a:r>
           </a:p>
           <a:p>
@@ -7487,7 +7479,7 @@
             </a:r>
             <a:r>
               <a:rPr lang="de-DE" dirty="0"/>
-              <a:t> eine Art von Übermensch</a:t>
+              <a:t> eventuell eine Art von Übermensch</a:t>
             </a:r>
           </a:p>
         </p:txBody>

</xml_diff>

<commit_message>
Merge mit Felix Version
</commit_message>
<xml_diff>
--- a/Präsentation/Berufsethik.pptx
+++ b/Präsentation/Berufsethik.pptx
@@ -233,7 +233,7 @@
           <a:p>
             <a:fld id="{B3F4BEC4-04EF-4CD0-BB52-1E33FCB75C1A}" type="datetimeFigureOut">
               <a:rPr lang="de-DE" smtClean="0"/>
-              <a:t>14.12.2017</a:t>
+              <a:t>15.12.2017</a:t>
             </a:fld>
             <a:endParaRPr lang="de-DE"/>
           </a:p>
@@ -2314,7 +2314,7 @@
           <a:p>
             <a:fld id="{34FCBE35-913E-4F5C-B82A-017151C3CF2E}" type="datetime1">
               <a:rPr lang="de-DE" smtClean="0"/>
-              <a:t>14.12.2017</a:t>
+              <a:t>15.12.2017</a:t>
             </a:fld>
             <a:endParaRPr lang="de-DE"/>
           </a:p>
@@ -2515,7 +2515,7 @@
           <a:p>
             <a:fld id="{2847ED52-B3C1-44AF-867B-E694896FE8F6}" type="datetime1">
               <a:rPr lang="de-DE" smtClean="0"/>
-              <a:t>14.12.2017</a:t>
+              <a:t>15.12.2017</a:t>
             </a:fld>
             <a:endParaRPr lang="de-DE"/>
           </a:p>
@@ -2726,7 +2726,7 @@
           <a:p>
             <a:fld id="{168BBAB2-6C7F-4450-A2AE-93CA97D58F94}" type="datetime1">
               <a:rPr lang="de-DE" smtClean="0"/>
-              <a:t>14.12.2017</a:t>
+              <a:t>15.12.2017</a:t>
             </a:fld>
             <a:endParaRPr lang="de-DE"/>
           </a:p>
@@ -2927,7 +2927,7 @@
           <a:p>
             <a:fld id="{37AAA59D-F5D9-4C22-BAD7-C7D8B056DE27}" type="datetime1">
               <a:rPr lang="de-DE" smtClean="0"/>
-              <a:t>14.12.2017</a:t>
+              <a:t>15.12.2017</a:t>
             </a:fld>
             <a:endParaRPr lang="de-DE"/>
           </a:p>
@@ -3205,7 +3205,7 @@
           <a:p>
             <a:fld id="{9E51E155-D360-4F19-A00F-78921EA1ECE0}" type="datetime1">
               <a:rPr lang="de-DE" smtClean="0"/>
-              <a:t>14.12.2017</a:t>
+              <a:t>15.12.2017</a:t>
             </a:fld>
             <a:endParaRPr lang="de-DE"/>
           </a:p>
@@ -3473,7 +3473,7 @@
           <a:p>
             <a:fld id="{E6839657-0B65-4D4D-95AE-D65A41317F2F}" type="datetime1">
               <a:rPr lang="de-DE" smtClean="0"/>
-              <a:t>14.12.2017</a:t>
+              <a:t>15.12.2017</a:t>
             </a:fld>
             <a:endParaRPr lang="de-DE"/>
           </a:p>
@@ -3888,7 +3888,7 @@
           <a:p>
             <a:fld id="{6556EF25-1D90-48A5-9D2B-C9B4C61351C3}" type="datetime1">
               <a:rPr lang="de-DE" smtClean="0"/>
-              <a:t>14.12.2017</a:t>
+              <a:t>15.12.2017</a:t>
             </a:fld>
             <a:endParaRPr lang="de-DE"/>
           </a:p>
@@ -4032,7 +4032,7 @@
           <a:p>
             <a:fld id="{E2A457FF-C8C2-4DB2-80B3-297A90E469B1}" type="datetime1">
               <a:rPr lang="de-DE" smtClean="0"/>
-              <a:t>14.12.2017</a:t>
+              <a:t>15.12.2017</a:t>
             </a:fld>
             <a:endParaRPr lang="de-DE"/>
           </a:p>
@@ -4148,7 +4148,7 @@
           <a:p>
             <a:fld id="{AD6C03A5-7FB1-43B2-8884-E9E9EB5E2312}" type="datetime1">
               <a:rPr lang="de-DE" smtClean="0"/>
-              <a:t>14.12.2017</a:t>
+              <a:t>15.12.2017</a:t>
             </a:fld>
             <a:endParaRPr lang="de-DE"/>
           </a:p>
@@ -4462,7 +4462,7 @@
           <a:p>
             <a:fld id="{2B9C9779-0FB9-4BCD-864C-0ACBE9ACB817}" type="datetime1">
               <a:rPr lang="de-DE" smtClean="0"/>
-              <a:t>14.12.2017</a:t>
+              <a:t>15.12.2017</a:t>
             </a:fld>
             <a:endParaRPr lang="de-DE"/>
           </a:p>
@@ -4753,7 +4753,7 @@
           <a:p>
             <a:fld id="{1F8E1D88-FA2D-4A0F-A99E-4B1D00F2DADF}" type="datetime1">
               <a:rPr lang="de-DE" smtClean="0"/>
-              <a:t>14.12.2017</a:t>
+              <a:t>15.12.2017</a:t>
             </a:fld>
             <a:endParaRPr lang="de-DE"/>
           </a:p>
@@ -4997,7 +4997,7 @@
           <a:p>
             <a:fld id="{4468ECC2-9D94-478C-A60A-A7D4155B71A1}" type="datetime1">
               <a:rPr lang="de-DE" smtClean="0"/>
-              <a:t>14.12.2017</a:t>
+              <a:t>15.12.2017</a:t>
             </a:fld>
             <a:endParaRPr lang="de-DE"/>
           </a:p>
@@ -5531,7 +5531,7 @@
           <a:p>
             <a:fld id="{9BB24A88-594C-46B6-B0D5-054D34368737}" type="datetime1">
               <a:rPr lang="de-DE" smtClean="0"/>
-              <a:t>14.12.2017</a:t>
+              <a:t>15.12.2017</a:t>
             </a:fld>
             <a:endParaRPr lang="de-DE"/>
           </a:p>
@@ -5838,7 +5838,7 @@
           <a:p>
             <a:fld id="{37AAA59D-F5D9-4C22-BAD7-C7D8B056DE27}" type="datetime1">
               <a:rPr lang="de-DE" smtClean="0"/>
-              <a:t>14.12.2017</a:t>
+              <a:t>15.12.2017</a:t>
             </a:fld>
             <a:endParaRPr lang="de-DE"/>
           </a:p>
@@ -6215,7 +6215,7 @@
           <a:p>
             <a:fld id="{37AAA59D-F5D9-4C22-BAD7-C7D8B056DE27}" type="datetime1">
               <a:rPr lang="de-DE" smtClean="0"/>
-              <a:t>14.12.2017</a:t>
+              <a:t>15.12.2017</a:t>
             </a:fld>
             <a:endParaRPr lang="de-DE" dirty="0"/>
           </a:p>
@@ -6626,7 +6626,7 @@
           <a:p>
             <a:fld id="{37AAA59D-F5D9-4C22-BAD7-C7D8B056DE27}" type="datetime1">
               <a:rPr lang="de-DE" smtClean="0"/>
-              <a:t>14.12.2017</a:t>
+              <a:t>15.12.2017</a:t>
             </a:fld>
             <a:endParaRPr lang="de-DE"/>
           </a:p>
@@ -6880,7 +6880,7 @@
           <a:p>
             <a:fld id="{37AAA59D-F5D9-4C22-BAD7-C7D8B056DE27}" type="datetime1">
               <a:rPr lang="de-DE" smtClean="0"/>
-              <a:t>14.12.2017</a:t>
+              <a:t>15.12.2017</a:t>
             </a:fld>
             <a:endParaRPr lang="de-DE"/>
           </a:p>
@@ -7073,7 +7073,7 @@
           <a:p>
             <a:fld id="{37AAA59D-F5D9-4C22-BAD7-C7D8B056DE27}" type="datetime1">
               <a:rPr lang="de-DE" smtClean="0"/>
-              <a:t>14.12.2017</a:t>
+              <a:t>15.12.2017</a:t>
             </a:fld>
             <a:endParaRPr lang="de-DE"/>
           </a:p>
@@ -7462,7 +7462,7 @@
           <a:p>
             <a:fld id="{37AAA59D-F5D9-4C22-BAD7-C7D8B056DE27}" type="datetime1">
               <a:rPr lang="de-DE" smtClean="0"/>
-              <a:t>14.12.2017</a:t>
+              <a:t>15.12.2017</a:t>
             </a:fld>
             <a:endParaRPr lang="de-DE"/>
           </a:p>
@@ -7669,7 +7669,7 @@
           <a:p>
             <a:fld id="{37AAA59D-F5D9-4C22-BAD7-C7D8B056DE27}" type="datetime1">
               <a:rPr lang="de-DE" smtClean="0"/>
-              <a:t>14.12.2017</a:t>
+              <a:t>15.12.2017</a:t>
             </a:fld>
             <a:endParaRPr lang="de-DE"/>
           </a:p>
@@ -7875,7 +7875,7 @@
           <a:p>
             <a:fld id="{37AAA59D-F5D9-4C22-BAD7-C7D8B056DE27}" type="datetime1">
               <a:rPr lang="de-DE" smtClean="0"/>
-              <a:t>14.12.2017</a:t>
+              <a:t>15.12.2017</a:t>
             </a:fld>
             <a:endParaRPr lang="de-DE"/>
           </a:p>
@@ -8074,7 +8074,7 @@
           <a:p>
             <a:fld id="{37AAA59D-F5D9-4C22-BAD7-C7D8B056DE27}" type="datetime1">
               <a:rPr lang="de-DE" smtClean="0"/>
-              <a:t>14.12.2017</a:t>
+              <a:t>15.12.2017</a:t>
             </a:fld>
             <a:endParaRPr lang="de-DE"/>
           </a:p>
@@ -8270,7 +8270,7 @@
           <a:p>
             <a:fld id="{37AAA59D-F5D9-4C22-BAD7-C7D8B056DE27}" type="datetime1">
               <a:rPr lang="de-DE" smtClean="0"/>
-              <a:t>14.12.2017</a:t>
+              <a:t>15.12.2017</a:t>
             </a:fld>
             <a:endParaRPr lang="de-DE"/>
           </a:p>
@@ -8467,7 +8467,7 @@
           <a:p>
             <a:fld id="{1B876D99-6DEA-420F-AEAC-AB387BCD608A}" type="datetime1">
               <a:rPr lang="de-DE" smtClean="0"/>
-              <a:t>14.12.2017</a:t>
+              <a:t>15.12.2017</a:t>
             </a:fld>
             <a:endParaRPr lang="de-DE"/>
           </a:p>
@@ -8643,7 +8643,7 @@
           <a:p>
             <a:fld id="{37AAA59D-F5D9-4C22-BAD7-C7D8B056DE27}" type="datetime1">
               <a:rPr lang="de-DE" smtClean="0"/>
-              <a:t>14.12.2017</a:t>
+              <a:t>15.12.2017</a:t>
             </a:fld>
             <a:endParaRPr lang="de-DE"/>
           </a:p>
@@ -9776,7 +9776,7 @@
           <a:p>
             <a:fld id="{37AAA59D-F5D9-4C22-BAD7-C7D8B056DE27}" type="datetime1">
               <a:rPr lang="de-DE" smtClean="0"/>
-              <a:t>14.12.2017</a:t>
+              <a:t>15.12.2017</a:t>
             </a:fld>
             <a:endParaRPr lang="de-DE"/>
           </a:p>
@@ -9948,7 +9948,7 @@
             </a:pPr>
             <a:r>
               <a:rPr lang="de-DE" sz="2800" dirty="0"/>
-              <a:t>Überwindung von Nihilismus, Religion und Moral</a:t>
+              <a:t>Überwindung von Religion und Moral</a:t>
             </a:r>
           </a:p>
           <a:p>
@@ -10002,7 +10002,7 @@
           <a:p>
             <a:fld id="{37AAA59D-F5D9-4C22-BAD7-C7D8B056DE27}" type="datetime1">
               <a:rPr lang="de-DE" smtClean="0"/>
-              <a:t>14.12.2017</a:t>
+              <a:t>15.12.2017</a:t>
             </a:fld>
             <a:endParaRPr lang="de-DE"/>
           </a:p>
@@ -10239,7 +10239,7 @@
           <a:p>
             <a:fld id="{37AAA59D-F5D9-4C22-BAD7-C7D8B056DE27}" type="datetime1">
               <a:rPr lang="de-DE" smtClean="0"/>
-              <a:t>14.12.2017</a:t>
+              <a:t>15.12.2017</a:t>
             </a:fld>
             <a:endParaRPr lang="de-DE"/>
           </a:p>
@@ -10493,7 +10493,7 @@
             </a:r>
             <a:r>
               <a:rPr lang="de-DE" dirty="0"/>
-              <a:t> eine Art von Übermensch</a:t>
+              <a:t> eventuell eine Art von Übermensch</a:t>
             </a:r>
           </a:p>
         </p:txBody>
@@ -10521,7 +10521,7 @@
           <a:p>
             <a:fld id="{37AAA59D-F5D9-4C22-BAD7-C7D8B056DE27}" type="datetime1">
               <a:rPr lang="de-DE" smtClean="0"/>
-              <a:t>14.12.2017</a:t>
+              <a:t>15.12.2017</a:t>
             </a:fld>
             <a:endParaRPr lang="de-DE"/>
           </a:p>
@@ -11041,7 +11041,7 @@
           <a:p>
             <a:fld id="{37AAA59D-F5D9-4C22-BAD7-C7D8B056DE27}" type="datetime1">
               <a:rPr lang="de-DE" smtClean="0"/>
-              <a:t>14.12.2017</a:t>
+              <a:t>15.12.2017</a:t>
             </a:fld>
             <a:endParaRPr lang="de-DE"/>
           </a:p>
@@ -11267,7 +11267,7 @@
           <a:p>
             <a:fld id="{37AAA59D-F5D9-4C22-BAD7-C7D8B056DE27}" type="datetime1">
               <a:rPr lang="de-DE" smtClean="0"/>
-              <a:t>14.12.2017</a:t>
+              <a:t>15.12.2017</a:t>
             </a:fld>
             <a:endParaRPr lang="de-DE"/>
           </a:p>
@@ -11522,7 +11522,7 @@
           <a:p>
             <a:fld id="{37AAA59D-F5D9-4C22-BAD7-C7D8B056DE27}" type="datetime1">
               <a:rPr lang="de-DE" smtClean="0"/>
-              <a:t>14.12.2017</a:t>
+              <a:t>15.12.2017</a:t>
             </a:fld>
             <a:endParaRPr lang="de-DE"/>
           </a:p>
@@ -11984,7 +11984,7 @@
           <a:p>
             <a:fld id="{37AAA59D-F5D9-4C22-BAD7-C7D8B056DE27}" type="datetime1">
               <a:rPr lang="de-DE" smtClean="0"/>
-              <a:t>14.12.2017</a:t>
+              <a:t>15.12.2017</a:t>
             </a:fld>
             <a:endParaRPr lang="de-DE"/>
           </a:p>
@@ -12483,7 +12483,7 @@
           <a:p>
             <a:fld id="{37AAA59D-F5D9-4C22-BAD7-C7D8B056DE27}" type="datetime1">
               <a:rPr lang="de-DE" smtClean="0"/>
-              <a:t>14.12.2017</a:t>
+              <a:t>15.12.2017</a:t>
             </a:fld>
             <a:endParaRPr lang="de-DE"/>
           </a:p>
@@ -12884,7 +12884,7 @@
           <a:p>
             <a:fld id="{37AAA59D-F5D9-4C22-BAD7-C7D8B056DE27}" type="datetime1">
               <a:rPr lang="de-DE" smtClean="0"/>
-              <a:t>14.12.2017</a:t>
+              <a:t>15.12.2017</a:t>
             </a:fld>
             <a:endParaRPr lang="de-DE"/>
           </a:p>
@@ -13028,7 +13028,7 @@
           <a:p>
             <a:fld id="{37AAA59D-F5D9-4C22-BAD7-C7D8B056DE27}" type="datetime1">
               <a:rPr lang="de-DE" smtClean="0"/>
-              <a:t>14.12.2017</a:t>
+              <a:t>15.12.2017</a:t>
             </a:fld>
             <a:endParaRPr lang="de-DE"/>
           </a:p>
@@ -13288,7 +13288,7 @@
           <a:p>
             <a:fld id="{37AAA59D-F5D9-4C22-BAD7-C7D8B056DE27}" type="datetime1">
               <a:rPr lang="de-DE" smtClean="0"/>
-              <a:t>14.12.2017</a:t>
+              <a:t>15.12.2017</a:t>
             </a:fld>
             <a:endParaRPr lang="de-DE"/>
           </a:p>
@@ -13507,7 +13507,7 @@
           <a:p>
             <a:fld id="{37AAA59D-F5D9-4C22-BAD7-C7D8B056DE27}" type="datetime1">
               <a:rPr lang="de-DE" smtClean="0"/>
-              <a:t>14.12.2017</a:t>
+              <a:t>15.12.2017</a:t>
             </a:fld>
             <a:endParaRPr lang="de-DE"/>
           </a:p>
@@ -13800,7 +13800,7 @@
           <a:p>
             <a:fld id="{37AAA59D-F5D9-4C22-BAD7-C7D8B056DE27}" type="datetime1">
               <a:rPr lang="de-DE" smtClean="0"/>
-              <a:t>14.12.2017</a:t>
+              <a:t>15.12.2017</a:t>
             </a:fld>
             <a:endParaRPr lang="de-DE"/>
           </a:p>
@@ -14087,7 +14087,7 @@
           <a:p>
             <a:fld id="{37AAA59D-F5D9-4C22-BAD7-C7D8B056DE27}" type="datetime1">
               <a:rPr lang="de-DE" smtClean="0"/>
-              <a:t>14.12.2017</a:t>
+              <a:t>15.12.2017</a:t>
             </a:fld>
             <a:endParaRPr lang="de-DE"/>
           </a:p>
@@ -14395,7 +14395,7 @@
           <a:p>
             <a:fld id="{37AAA59D-F5D9-4C22-BAD7-C7D8B056DE27}" type="datetime1">
               <a:rPr lang="de-DE" smtClean="0"/>
-              <a:t>14.12.2017</a:t>
+              <a:t>15.12.2017</a:t>
             </a:fld>
             <a:endParaRPr lang="de-DE"/>
           </a:p>
@@ -14636,7 +14636,7 @@
           <a:p>
             <a:fld id="{37AAA59D-F5D9-4C22-BAD7-C7D8B056DE27}" type="datetime1">
               <a:rPr lang="de-DE" smtClean="0"/>
-              <a:t>14.12.2017</a:t>
+              <a:t>15.12.2017</a:t>
             </a:fld>
             <a:endParaRPr lang="de-DE"/>
           </a:p>

</xml_diff>

<commit_message>
ENDFASSUNG FÜR DIE PRÄSENTATION
</commit_message>
<xml_diff>
--- a/Präsentation/Berufsethik.pptx
+++ b/Präsentation/Berufsethik.pptx
@@ -13127,10 +13127,10 @@
       </p:sp>
       <p:pic>
         <p:nvPicPr>
-          <p:cNvPr id="9" name="Grafik 8">
-            <a:extLst>
-              <a:ext uri="{FF2B5EF4-FFF2-40B4-BE49-F238E27FC236}">
-                <a16:creationId xmlns:a16="http://schemas.microsoft.com/office/drawing/2014/main" id="{C0E27C73-6DDD-4869-B5A1-B0B00652DA43}"/>
+          <p:cNvPr id="8" name="Grafik 7">
+            <a:extLst>
+              <a:ext uri="{FF2B5EF4-FFF2-40B4-BE49-F238E27FC236}">
+                <a16:creationId xmlns:a16="http://schemas.microsoft.com/office/drawing/2014/main" id="{B33EC1A8-1EAF-4461-89AB-265338422C94}"/>
               </a:ext>
             </a:extLst>
           </p:cNvPr>
@@ -13147,14 +13147,13 @@
         </p:blipFill>
         <p:spPr>
           <a:xfrm>
-            <a:off x="5400674" y="4404519"/>
-            <a:ext cx="1390650" cy="352425"/>
+            <a:off x="5269613" y="4270164"/>
+            <a:ext cx="1652771" cy="536034"/>
           </a:xfrm>
           <a:prstGeom prst="rect">
             <a:avLst/>
           </a:prstGeom>
-          <a:noFill/>
-          <a:ln w="12700">
+          <a:ln>
             <a:solidFill>
               <a:schemeClr val="tx1"/>
             </a:solidFill>

</xml_diff>